<commit_message>
Domingo a noite em SP
</commit_message>
<xml_diff>
--- a/PPT_linhas_de_tendencias.pptx
+++ b/PPT_linhas_de_tendencias.pptx
@@ -274,7 +274,7 @@
           <a:p>
             <a:fld id="{6CEA6FA6-44D5-495B-A5B5-7F98A644735A}" type="datetimeFigureOut">
               <a:rPr lang="pt-BR" smtClean="0"/>
-              <a:t>08/12/2023</a:t>
+              <a:t>10/12/2023</a:t>
             </a:fld>
             <a:endParaRPr lang="pt-BR"/>
           </a:p>
@@ -472,7 +472,7 @@
           <a:p>
             <a:fld id="{6CEA6FA6-44D5-495B-A5B5-7F98A644735A}" type="datetimeFigureOut">
               <a:rPr lang="pt-BR" smtClean="0"/>
-              <a:t>08/12/2023</a:t>
+              <a:t>10/12/2023</a:t>
             </a:fld>
             <a:endParaRPr lang="pt-BR"/>
           </a:p>
@@ -680,7 +680,7 @@
           <a:p>
             <a:fld id="{6CEA6FA6-44D5-495B-A5B5-7F98A644735A}" type="datetimeFigureOut">
               <a:rPr lang="pt-BR" smtClean="0"/>
-              <a:t>08/12/2023</a:t>
+              <a:t>10/12/2023</a:t>
             </a:fld>
             <a:endParaRPr lang="pt-BR"/>
           </a:p>
@@ -878,7 +878,7 @@
           <a:p>
             <a:fld id="{6CEA6FA6-44D5-495B-A5B5-7F98A644735A}" type="datetimeFigureOut">
               <a:rPr lang="pt-BR" smtClean="0"/>
-              <a:t>08/12/2023</a:t>
+              <a:t>10/12/2023</a:t>
             </a:fld>
             <a:endParaRPr lang="pt-BR"/>
           </a:p>
@@ -1153,7 +1153,7 @@
           <a:p>
             <a:fld id="{6CEA6FA6-44D5-495B-A5B5-7F98A644735A}" type="datetimeFigureOut">
               <a:rPr lang="pt-BR" smtClean="0"/>
-              <a:t>08/12/2023</a:t>
+              <a:t>10/12/2023</a:t>
             </a:fld>
             <a:endParaRPr lang="pt-BR"/>
           </a:p>
@@ -1418,7 +1418,7 @@
           <a:p>
             <a:fld id="{6CEA6FA6-44D5-495B-A5B5-7F98A644735A}" type="datetimeFigureOut">
               <a:rPr lang="pt-BR" smtClean="0"/>
-              <a:t>08/12/2023</a:t>
+              <a:t>10/12/2023</a:t>
             </a:fld>
             <a:endParaRPr lang="pt-BR"/>
           </a:p>
@@ -1830,7 +1830,7 @@
           <a:p>
             <a:fld id="{6CEA6FA6-44D5-495B-A5B5-7F98A644735A}" type="datetimeFigureOut">
               <a:rPr lang="pt-BR" smtClean="0"/>
-              <a:t>08/12/2023</a:t>
+              <a:t>10/12/2023</a:t>
             </a:fld>
             <a:endParaRPr lang="pt-BR"/>
           </a:p>
@@ -1971,7 +1971,7 @@
           <a:p>
             <a:fld id="{6CEA6FA6-44D5-495B-A5B5-7F98A644735A}" type="datetimeFigureOut">
               <a:rPr lang="pt-BR" smtClean="0"/>
-              <a:t>08/12/2023</a:t>
+              <a:t>10/12/2023</a:t>
             </a:fld>
             <a:endParaRPr lang="pt-BR"/>
           </a:p>
@@ -2084,7 +2084,7 @@
           <a:p>
             <a:fld id="{6CEA6FA6-44D5-495B-A5B5-7F98A644735A}" type="datetimeFigureOut">
               <a:rPr lang="pt-BR" smtClean="0"/>
-              <a:t>08/12/2023</a:t>
+              <a:t>10/12/2023</a:t>
             </a:fld>
             <a:endParaRPr lang="pt-BR"/>
           </a:p>
@@ -2395,7 +2395,7 @@
           <a:p>
             <a:fld id="{6CEA6FA6-44D5-495B-A5B5-7F98A644735A}" type="datetimeFigureOut">
               <a:rPr lang="pt-BR" smtClean="0"/>
-              <a:t>08/12/2023</a:t>
+              <a:t>10/12/2023</a:t>
             </a:fld>
             <a:endParaRPr lang="pt-BR"/>
           </a:p>
@@ -2683,7 +2683,7 @@
           <a:p>
             <a:fld id="{6CEA6FA6-44D5-495B-A5B5-7F98A644735A}" type="datetimeFigureOut">
               <a:rPr lang="pt-BR" smtClean="0"/>
-              <a:t>08/12/2023</a:t>
+              <a:t>10/12/2023</a:t>
             </a:fld>
             <a:endParaRPr lang="pt-BR"/>
           </a:p>
@@ -2924,7 +2924,7 @@
           <a:p>
             <a:fld id="{6CEA6FA6-44D5-495B-A5B5-7F98A644735A}" type="datetimeFigureOut">
               <a:rPr lang="pt-BR" smtClean="0"/>
-              <a:t>08/12/2023</a:t>
+              <a:t>10/12/2023</a:t>
             </a:fld>
             <a:endParaRPr lang="pt-BR"/>
           </a:p>
@@ -6597,10 +6597,10 @@
       </p:grpSpPr>
       <p:pic>
         <p:nvPicPr>
-          <p:cNvPr id="6" name="Imagem 5" descr="Gráfico, Histograma&#10;&#10;Descrição gerada automaticamente">
-            <a:extLst>
-              <a:ext uri="{FF2B5EF4-FFF2-40B4-BE49-F238E27FC236}">
-                <a16:creationId xmlns:a16="http://schemas.microsoft.com/office/drawing/2014/main" id="{09D7CCBE-B48B-8991-427F-A70E8CD026CB}"/>
+          <p:cNvPr id="6" name="Imagem 5" descr="Gráfico&#10;&#10;Descrição gerada automaticamente">
+            <a:extLst>
+              <a:ext uri="{FF2B5EF4-FFF2-40B4-BE49-F238E27FC236}">
+                <a16:creationId xmlns:a16="http://schemas.microsoft.com/office/drawing/2014/main" id="{84E4F1C7-EF0F-5114-B9D6-1607A914DC7E}"/>
               </a:ext>
             </a:extLst>
           </p:cNvPr>
@@ -6623,8 +6623,8 @@
         </p:blipFill>
         <p:spPr>
           <a:xfrm>
-            <a:off x="76200" y="38099"/>
-            <a:ext cx="11991209" cy="6734176"/>
+            <a:off x="247650" y="90487"/>
+            <a:ext cx="11906250" cy="6466527"/>
           </a:xfrm>
           <a:prstGeom prst="rect">
             <a:avLst/>
@@ -6678,91 +6678,6 @@
       </p:cxnSp>
       <p:sp>
         <p:nvSpPr>
-          <p:cNvPr id="2" name="Retângulo 1">
-            <a:extLst>
-              <a:ext uri="{FF2B5EF4-FFF2-40B4-BE49-F238E27FC236}">
-                <a16:creationId xmlns:a16="http://schemas.microsoft.com/office/drawing/2014/main" id="{D4D80616-9011-1442-F773-0F441C953D4F}"/>
-              </a:ext>
-            </a:extLst>
-          </p:cNvPr>
-          <p:cNvSpPr/>
-          <p:nvPr/>
-        </p:nvSpPr>
-        <p:spPr>
-          <a:xfrm>
-            <a:off x="1774823" y="4761259"/>
-            <a:ext cx="511200" cy="844550"/>
-          </a:xfrm>
-          <a:prstGeom prst="rect">
-            <a:avLst/>
-          </a:prstGeom>
-          <a:noFill/>
-        </p:spPr>
-        <p:style>
-          <a:lnRef idx="2">
-            <a:schemeClr val="accent1">
-              <a:shade val="15000"/>
-            </a:schemeClr>
-          </a:lnRef>
-          <a:fillRef idx="1">
-            <a:schemeClr val="accent1"/>
-          </a:fillRef>
-          <a:effectRef idx="0">
-            <a:schemeClr val="accent1"/>
-          </a:effectRef>
-          <a:fontRef idx="minor">
-            <a:schemeClr val="lt1"/>
-          </a:fontRef>
-        </p:style>
-        <p:txBody>
-          <a:bodyPr rtlCol="0" anchor="ctr"/>
-          <a:lstStyle/>
-          <a:p>
-            <a:pPr algn="ctr"/>
-            <a:endParaRPr lang="pt-BR"/>
-          </a:p>
-        </p:txBody>
-      </p:sp>
-      <p:cxnSp>
-        <p:nvCxnSpPr>
-          <p:cNvPr id="5" name="Conector reto 4">
-            <a:extLst>
-              <a:ext uri="{FF2B5EF4-FFF2-40B4-BE49-F238E27FC236}">
-                <a16:creationId xmlns:a16="http://schemas.microsoft.com/office/drawing/2014/main" id="{BBDE7972-53E3-517F-7EBF-B56BAE5A2991}"/>
-              </a:ext>
-            </a:extLst>
-          </p:cNvPr>
-          <p:cNvCxnSpPr>
-            <a:cxnSpLocks/>
-          </p:cNvCxnSpPr>
-          <p:nvPr/>
-        </p:nvCxnSpPr>
-        <p:spPr>
-          <a:xfrm>
-            <a:off x="2076446" y="5136834"/>
-            <a:ext cx="1085850" cy="0"/>
-          </a:xfrm>
-          <a:prstGeom prst="line">
-            <a:avLst/>
-          </a:prstGeom>
-        </p:spPr>
-        <p:style>
-          <a:lnRef idx="1">
-            <a:schemeClr val="accent1"/>
-          </a:lnRef>
-          <a:fillRef idx="0">
-            <a:schemeClr val="accent1"/>
-          </a:fillRef>
-          <a:effectRef idx="0">
-            <a:schemeClr val="accent1"/>
-          </a:effectRef>
-          <a:fontRef idx="minor">
-            <a:schemeClr val="tx1"/>
-          </a:fontRef>
-        </p:style>
-      </p:cxnSp>
-      <p:sp>
-        <p:nvSpPr>
           <p:cNvPr id="9" name="Elipse 8">
             <a:extLst>
               <a:ext uri="{FF2B5EF4-FFF2-40B4-BE49-F238E27FC236}">
@@ -6869,34 +6784,34 @@
         </p:nvCxnSpPr>
         <p:spPr>
           <a:xfrm flipV="1">
-            <a:off x="2376488" y="5379620"/>
-            <a:ext cx="890587" cy="195680"/>
-          </a:xfrm>
-          <a:prstGeom prst="line">
-            <a:avLst/>
-          </a:prstGeom>
-        </p:spPr>
-        <p:style>
-          <a:lnRef idx="1">
-            <a:schemeClr val="accent1"/>
-          </a:lnRef>
-          <a:fillRef idx="0">
-            <a:schemeClr val="accent1"/>
-          </a:fillRef>
-          <a:effectRef idx="0">
-            <a:schemeClr val="accent1"/>
-          </a:effectRef>
-          <a:fontRef idx="minor">
-            <a:schemeClr val="tx1"/>
-          </a:fontRef>
-        </p:style>
-      </p:cxnSp>
-      <p:cxnSp>
-        <p:nvCxnSpPr>
-          <p:cNvPr id="24" name="Conector reto 23">
-            <a:extLst>
-              <a:ext uri="{FF2B5EF4-FFF2-40B4-BE49-F238E27FC236}">
-                <a16:creationId xmlns:a16="http://schemas.microsoft.com/office/drawing/2014/main" id="{2917B404-5AEE-D949-6A74-8307083A5F74}"/>
+            <a:off x="2232660" y="4655820"/>
+            <a:ext cx="5867400" cy="792480"/>
+          </a:xfrm>
+          <a:prstGeom prst="line">
+            <a:avLst/>
+          </a:prstGeom>
+        </p:spPr>
+        <p:style>
+          <a:lnRef idx="1">
+            <a:schemeClr val="accent1"/>
+          </a:lnRef>
+          <a:fillRef idx="0">
+            <a:schemeClr val="accent1"/>
+          </a:fillRef>
+          <a:effectRef idx="0">
+            <a:schemeClr val="accent1"/>
+          </a:effectRef>
+          <a:fontRef idx="minor">
+            <a:schemeClr val="tx1"/>
+          </a:fontRef>
+        </p:style>
+      </p:cxnSp>
+      <p:cxnSp>
+        <p:nvCxnSpPr>
+          <p:cNvPr id="7" name="Conector reto 6">
+            <a:extLst>
+              <a:ext uri="{FF2B5EF4-FFF2-40B4-BE49-F238E27FC236}">
+                <a16:creationId xmlns:a16="http://schemas.microsoft.com/office/drawing/2014/main" id="{9204B02C-DF9A-50A9-1687-DFA4C3FF79E6}"/>
               </a:ext>
             </a:extLst>
           </p:cNvPr>
@@ -6906,35 +6821,35 @@
           <p:nvPr/>
         </p:nvCxnSpPr>
         <p:spPr>
-          <a:xfrm>
-            <a:off x="2128550" y="4821563"/>
-            <a:ext cx="1285869" cy="268908"/>
-          </a:xfrm>
-          <a:prstGeom prst="line">
-            <a:avLst/>
-          </a:prstGeom>
-        </p:spPr>
-        <p:style>
-          <a:lnRef idx="1">
-            <a:schemeClr val="accent1"/>
-          </a:lnRef>
-          <a:fillRef idx="0">
-            <a:schemeClr val="accent1"/>
-          </a:fillRef>
-          <a:effectRef idx="0">
-            <a:schemeClr val="accent1"/>
-          </a:effectRef>
-          <a:fontRef idx="minor">
-            <a:schemeClr val="tx1"/>
-          </a:fontRef>
-        </p:style>
-      </p:cxnSp>
-      <p:cxnSp>
-        <p:nvCxnSpPr>
-          <p:cNvPr id="7" name="Conector reto 6">
-            <a:extLst>
-              <a:ext uri="{FF2B5EF4-FFF2-40B4-BE49-F238E27FC236}">
-                <a16:creationId xmlns:a16="http://schemas.microsoft.com/office/drawing/2014/main" id="{9204B02C-DF9A-50A9-1687-DFA4C3FF79E6}"/>
+          <a:xfrm flipV="1">
+            <a:off x="3744048" y="4786737"/>
+            <a:ext cx="1125182" cy="350097"/>
+          </a:xfrm>
+          <a:prstGeom prst="line">
+            <a:avLst/>
+          </a:prstGeom>
+        </p:spPr>
+        <p:style>
+          <a:lnRef idx="1">
+            <a:schemeClr val="accent1"/>
+          </a:lnRef>
+          <a:fillRef idx="0">
+            <a:schemeClr val="accent1"/>
+          </a:fillRef>
+          <a:effectRef idx="0">
+            <a:schemeClr val="accent1"/>
+          </a:effectRef>
+          <a:fontRef idx="minor">
+            <a:schemeClr val="tx1"/>
+          </a:fontRef>
+        </p:style>
+      </p:cxnSp>
+      <p:cxnSp>
+        <p:nvCxnSpPr>
+          <p:cNvPr id="16" name="Conector reto 15">
+            <a:extLst>
+              <a:ext uri="{FF2B5EF4-FFF2-40B4-BE49-F238E27FC236}">
+                <a16:creationId xmlns:a16="http://schemas.microsoft.com/office/drawing/2014/main" id="{08D3BAC5-A69A-3EFE-D980-1504F678A268}"/>
               </a:ext>
             </a:extLst>
           </p:cNvPr>
@@ -6944,35 +6859,35 @@
           <p:nvPr/>
         </p:nvCxnSpPr>
         <p:spPr>
-          <a:xfrm>
-            <a:off x="2696355" y="5274479"/>
-            <a:ext cx="342114" cy="0"/>
-          </a:xfrm>
-          <a:prstGeom prst="line">
-            <a:avLst/>
-          </a:prstGeom>
-        </p:spPr>
-        <p:style>
-          <a:lnRef idx="1">
-            <a:schemeClr val="accent1"/>
-          </a:lnRef>
-          <a:fillRef idx="0">
-            <a:schemeClr val="accent1"/>
-          </a:fillRef>
-          <a:effectRef idx="0">
-            <a:schemeClr val="accent1"/>
-          </a:effectRef>
-          <a:fontRef idx="minor">
-            <a:schemeClr val="tx1"/>
-          </a:fontRef>
-        </p:style>
-      </p:cxnSp>
-      <p:cxnSp>
-        <p:nvCxnSpPr>
-          <p:cNvPr id="16" name="Conector reto 15">
-            <a:extLst>
-              <a:ext uri="{FF2B5EF4-FFF2-40B4-BE49-F238E27FC236}">
-                <a16:creationId xmlns:a16="http://schemas.microsoft.com/office/drawing/2014/main" id="{08D3BAC5-A69A-3EFE-D980-1504F678A268}"/>
+          <a:xfrm flipV="1">
+            <a:off x="3294069" y="4761259"/>
+            <a:ext cx="969956" cy="897201"/>
+          </a:xfrm>
+          <a:prstGeom prst="line">
+            <a:avLst/>
+          </a:prstGeom>
+        </p:spPr>
+        <p:style>
+          <a:lnRef idx="1">
+            <a:schemeClr val="accent1"/>
+          </a:lnRef>
+          <a:fillRef idx="0">
+            <a:schemeClr val="accent1"/>
+          </a:fillRef>
+          <a:effectRef idx="0">
+            <a:schemeClr val="accent1"/>
+          </a:effectRef>
+          <a:fontRef idx="minor">
+            <a:schemeClr val="tx1"/>
+          </a:fontRef>
+        </p:style>
+      </p:cxnSp>
+      <p:cxnSp>
+        <p:nvCxnSpPr>
+          <p:cNvPr id="14" name="Conector reto 13">
+            <a:extLst>
+              <a:ext uri="{FF2B5EF4-FFF2-40B4-BE49-F238E27FC236}">
+                <a16:creationId xmlns:a16="http://schemas.microsoft.com/office/drawing/2014/main" id="{161FD5AC-7ED3-B0AA-2133-2A9F35405873}"/>
               </a:ext>
             </a:extLst>
           </p:cNvPr>
@@ -6983,8 +6898,539 @@
         </p:nvCxnSpPr>
         <p:spPr>
           <a:xfrm flipV="1">
-            <a:off x="3267075" y="4761259"/>
-            <a:ext cx="996950" cy="1039669"/>
+            <a:off x="3324225" y="4502468"/>
+            <a:ext cx="3852863" cy="1101115"/>
+          </a:xfrm>
+          <a:prstGeom prst="line">
+            <a:avLst/>
+          </a:prstGeom>
+        </p:spPr>
+        <p:style>
+          <a:lnRef idx="1">
+            <a:schemeClr val="accent1"/>
+          </a:lnRef>
+          <a:fillRef idx="0">
+            <a:schemeClr val="accent1"/>
+          </a:fillRef>
+          <a:effectRef idx="0">
+            <a:schemeClr val="accent1"/>
+          </a:effectRef>
+          <a:fontRef idx="minor">
+            <a:schemeClr val="tx1"/>
+          </a:fontRef>
+        </p:style>
+      </p:cxnSp>
+      <p:cxnSp>
+        <p:nvCxnSpPr>
+          <p:cNvPr id="18" name="Conector reto 17">
+            <a:extLst>
+              <a:ext uri="{FF2B5EF4-FFF2-40B4-BE49-F238E27FC236}">
+                <a16:creationId xmlns:a16="http://schemas.microsoft.com/office/drawing/2014/main" id="{2EB4F81F-ADD0-6340-C5B9-4AA094870525}"/>
+              </a:ext>
+            </a:extLst>
+          </p:cNvPr>
+          <p:cNvCxnSpPr>
+            <a:cxnSpLocks/>
+          </p:cNvCxnSpPr>
+          <p:nvPr/>
+        </p:nvCxnSpPr>
+        <p:spPr>
+          <a:xfrm flipV="1">
+            <a:off x="3360420" y="5166360"/>
+            <a:ext cx="4861560" cy="419100"/>
+          </a:xfrm>
+          <a:prstGeom prst="line">
+            <a:avLst/>
+          </a:prstGeom>
+        </p:spPr>
+        <p:style>
+          <a:lnRef idx="1">
+            <a:schemeClr val="accent1"/>
+          </a:lnRef>
+          <a:fillRef idx="0">
+            <a:schemeClr val="accent1"/>
+          </a:fillRef>
+          <a:effectRef idx="0">
+            <a:schemeClr val="accent1"/>
+          </a:effectRef>
+          <a:fontRef idx="minor">
+            <a:schemeClr val="tx1"/>
+          </a:fontRef>
+        </p:style>
+      </p:cxnSp>
+      <p:cxnSp>
+        <p:nvCxnSpPr>
+          <p:cNvPr id="27" name="Conector reto 26">
+            <a:extLst>
+              <a:ext uri="{FF2B5EF4-FFF2-40B4-BE49-F238E27FC236}">
+                <a16:creationId xmlns:a16="http://schemas.microsoft.com/office/drawing/2014/main" id="{45F819F8-135E-3280-0897-41B3116A2D9A}"/>
+              </a:ext>
+            </a:extLst>
+          </p:cNvPr>
+          <p:cNvCxnSpPr/>
+          <p:nvPr/>
+        </p:nvCxnSpPr>
+        <p:spPr>
+          <a:xfrm>
+            <a:off x="7882576" y="1828959"/>
+            <a:ext cx="0" cy="3886200"/>
+          </a:xfrm>
+          <a:prstGeom prst="line">
+            <a:avLst/>
+          </a:prstGeom>
+        </p:spPr>
+        <p:style>
+          <a:lnRef idx="1">
+            <a:schemeClr val="accent1"/>
+          </a:lnRef>
+          <a:fillRef idx="0">
+            <a:schemeClr val="accent1"/>
+          </a:fillRef>
+          <a:effectRef idx="0">
+            <a:schemeClr val="accent1"/>
+          </a:effectRef>
+          <a:fontRef idx="minor">
+            <a:schemeClr val="tx1"/>
+          </a:fontRef>
+        </p:style>
+      </p:cxnSp>
+      <p:cxnSp>
+        <p:nvCxnSpPr>
+          <p:cNvPr id="28" name="Conector reto 27">
+            <a:extLst>
+              <a:ext uri="{FF2B5EF4-FFF2-40B4-BE49-F238E27FC236}">
+                <a16:creationId xmlns:a16="http://schemas.microsoft.com/office/drawing/2014/main" id="{24226A1E-EBB3-A892-BA6B-793C2959D896}"/>
+              </a:ext>
+            </a:extLst>
+          </p:cNvPr>
+          <p:cNvCxnSpPr/>
+          <p:nvPr/>
+        </p:nvCxnSpPr>
+        <p:spPr>
+          <a:xfrm>
+            <a:off x="6982146" y="1813084"/>
+            <a:ext cx="0" cy="3886200"/>
+          </a:xfrm>
+          <a:prstGeom prst="line">
+            <a:avLst/>
+          </a:prstGeom>
+        </p:spPr>
+        <p:style>
+          <a:lnRef idx="1">
+            <a:schemeClr val="accent1"/>
+          </a:lnRef>
+          <a:fillRef idx="0">
+            <a:schemeClr val="accent1"/>
+          </a:fillRef>
+          <a:effectRef idx="0">
+            <a:schemeClr val="accent1"/>
+          </a:effectRef>
+          <a:fontRef idx="minor">
+            <a:schemeClr val="tx1"/>
+          </a:fontRef>
+        </p:style>
+      </p:cxnSp>
+      <p:cxnSp>
+        <p:nvCxnSpPr>
+          <p:cNvPr id="29" name="Conector reto 28">
+            <a:extLst>
+              <a:ext uri="{FF2B5EF4-FFF2-40B4-BE49-F238E27FC236}">
+                <a16:creationId xmlns:a16="http://schemas.microsoft.com/office/drawing/2014/main" id="{2C996203-F3EB-A555-91AF-A30FCDC45272}"/>
+              </a:ext>
+            </a:extLst>
+          </p:cNvPr>
+          <p:cNvCxnSpPr/>
+          <p:nvPr/>
+        </p:nvCxnSpPr>
+        <p:spPr>
+          <a:xfrm>
+            <a:off x="3332982" y="1458211"/>
+            <a:ext cx="0" cy="3886200"/>
+          </a:xfrm>
+          <a:prstGeom prst="line">
+            <a:avLst/>
+          </a:prstGeom>
+          <a:ln>
+            <a:solidFill>
+              <a:srgbClr val="FF0000"/>
+            </a:solidFill>
+          </a:ln>
+        </p:spPr>
+        <p:style>
+          <a:lnRef idx="1">
+            <a:schemeClr val="accent1"/>
+          </a:lnRef>
+          <a:fillRef idx="0">
+            <a:schemeClr val="accent1"/>
+          </a:fillRef>
+          <a:effectRef idx="0">
+            <a:schemeClr val="accent1"/>
+          </a:effectRef>
+          <a:fontRef idx="minor">
+            <a:schemeClr val="tx1"/>
+          </a:fontRef>
+        </p:style>
+      </p:cxnSp>
+      <p:cxnSp>
+        <p:nvCxnSpPr>
+          <p:cNvPr id="30" name="Conector reto 29">
+            <a:extLst>
+              <a:ext uri="{FF2B5EF4-FFF2-40B4-BE49-F238E27FC236}">
+                <a16:creationId xmlns:a16="http://schemas.microsoft.com/office/drawing/2014/main" id="{994C6CE6-D462-1029-F5EA-20B9E72B123F}"/>
+              </a:ext>
+            </a:extLst>
+          </p:cNvPr>
+          <p:cNvCxnSpPr/>
+          <p:nvPr/>
+        </p:nvCxnSpPr>
+        <p:spPr>
+          <a:xfrm>
+            <a:off x="5084131" y="1594009"/>
+            <a:ext cx="0" cy="3886200"/>
+          </a:xfrm>
+          <a:prstGeom prst="line">
+            <a:avLst/>
+          </a:prstGeom>
+        </p:spPr>
+        <p:style>
+          <a:lnRef idx="1">
+            <a:schemeClr val="accent1"/>
+          </a:lnRef>
+          <a:fillRef idx="0">
+            <a:schemeClr val="accent1"/>
+          </a:fillRef>
+          <a:effectRef idx="0">
+            <a:schemeClr val="accent1"/>
+          </a:effectRef>
+          <a:fontRef idx="minor">
+            <a:schemeClr val="tx1"/>
+          </a:fontRef>
+        </p:style>
+      </p:cxnSp>
+      <p:cxnSp>
+        <p:nvCxnSpPr>
+          <p:cNvPr id="31" name="Conector reto 30">
+            <a:extLst>
+              <a:ext uri="{FF2B5EF4-FFF2-40B4-BE49-F238E27FC236}">
+                <a16:creationId xmlns:a16="http://schemas.microsoft.com/office/drawing/2014/main" id="{E94E84E1-D915-F279-5217-7E33AAD703F3}"/>
+              </a:ext>
+            </a:extLst>
+          </p:cNvPr>
+          <p:cNvCxnSpPr/>
+          <p:nvPr/>
+        </p:nvCxnSpPr>
+        <p:spPr>
+          <a:xfrm>
+            <a:off x="7829871" y="1652588"/>
+            <a:ext cx="0" cy="3886200"/>
+          </a:xfrm>
+          <a:prstGeom prst="line">
+            <a:avLst/>
+          </a:prstGeom>
+        </p:spPr>
+        <p:style>
+          <a:lnRef idx="1">
+            <a:schemeClr val="accent1"/>
+          </a:lnRef>
+          <a:fillRef idx="0">
+            <a:schemeClr val="accent1"/>
+          </a:fillRef>
+          <a:effectRef idx="0">
+            <a:schemeClr val="accent1"/>
+          </a:effectRef>
+          <a:fontRef idx="minor">
+            <a:schemeClr val="tx1"/>
+          </a:fontRef>
+        </p:style>
+      </p:cxnSp>
+      <p:cxnSp>
+        <p:nvCxnSpPr>
+          <p:cNvPr id="32" name="Conector reto 31">
+            <a:extLst>
+              <a:ext uri="{FF2B5EF4-FFF2-40B4-BE49-F238E27FC236}">
+                <a16:creationId xmlns:a16="http://schemas.microsoft.com/office/drawing/2014/main" id="{07837DC1-9FE1-0A26-223E-C450FBBFFE6D}"/>
+              </a:ext>
+            </a:extLst>
+          </p:cNvPr>
+          <p:cNvCxnSpPr/>
+          <p:nvPr/>
+        </p:nvCxnSpPr>
+        <p:spPr>
+          <a:xfrm>
+            <a:off x="8805231" y="1462841"/>
+            <a:ext cx="0" cy="3886200"/>
+          </a:xfrm>
+          <a:prstGeom prst="line">
+            <a:avLst/>
+          </a:prstGeom>
+        </p:spPr>
+        <p:style>
+          <a:lnRef idx="1">
+            <a:schemeClr val="accent1"/>
+          </a:lnRef>
+          <a:fillRef idx="0">
+            <a:schemeClr val="accent1"/>
+          </a:fillRef>
+          <a:effectRef idx="0">
+            <a:schemeClr val="accent1"/>
+          </a:effectRef>
+          <a:fontRef idx="minor">
+            <a:schemeClr val="tx1"/>
+          </a:fontRef>
+        </p:style>
+      </p:cxnSp>
+      <p:cxnSp>
+        <p:nvCxnSpPr>
+          <p:cNvPr id="17" name="Conector reto 16">
+            <a:extLst>
+              <a:ext uri="{FF2B5EF4-FFF2-40B4-BE49-F238E27FC236}">
+                <a16:creationId xmlns:a16="http://schemas.microsoft.com/office/drawing/2014/main" id="{2FDFF476-D726-7A30-37D1-D4CA9E1703C0}"/>
+              </a:ext>
+            </a:extLst>
+          </p:cNvPr>
+          <p:cNvCxnSpPr/>
+          <p:nvPr/>
+        </p:nvCxnSpPr>
+        <p:spPr>
+          <a:xfrm>
+            <a:off x="3648141" y="1483895"/>
+            <a:ext cx="0" cy="3886200"/>
+          </a:xfrm>
+          <a:prstGeom prst="line">
+            <a:avLst/>
+          </a:prstGeom>
+        </p:spPr>
+        <p:style>
+          <a:lnRef idx="1">
+            <a:schemeClr val="accent1"/>
+          </a:lnRef>
+          <a:fillRef idx="0">
+            <a:schemeClr val="accent1"/>
+          </a:fillRef>
+          <a:effectRef idx="0">
+            <a:schemeClr val="accent1"/>
+          </a:effectRef>
+          <a:fontRef idx="minor">
+            <a:schemeClr val="tx1"/>
+          </a:fontRef>
+        </p:style>
+      </p:cxnSp>
+      <p:cxnSp>
+        <p:nvCxnSpPr>
+          <p:cNvPr id="19" name="Conector reto 18">
+            <a:extLst>
+              <a:ext uri="{FF2B5EF4-FFF2-40B4-BE49-F238E27FC236}">
+                <a16:creationId xmlns:a16="http://schemas.microsoft.com/office/drawing/2014/main" id="{1A6B0D5B-AD31-BF94-D72A-EF041DCA2628}"/>
+              </a:ext>
+            </a:extLst>
+          </p:cNvPr>
+          <p:cNvCxnSpPr/>
+          <p:nvPr/>
+        </p:nvCxnSpPr>
+        <p:spPr>
+          <a:xfrm>
+            <a:off x="4342632" y="1485900"/>
+            <a:ext cx="0" cy="3886200"/>
+          </a:xfrm>
+          <a:prstGeom prst="line">
+            <a:avLst/>
+          </a:prstGeom>
+          <a:ln>
+            <a:solidFill>
+              <a:srgbClr val="FF0000"/>
+            </a:solidFill>
+          </a:ln>
+        </p:spPr>
+        <p:style>
+          <a:lnRef idx="1">
+            <a:schemeClr val="accent1"/>
+          </a:lnRef>
+          <a:fillRef idx="0">
+            <a:schemeClr val="accent1"/>
+          </a:fillRef>
+          <a:effectRef idx="0">
+            <a:schemeClr val="accent1"/>
+          </a:effectRef>
+          <a:fontRef idx="minor">
+            <a:schemeClr val="tx1"/>
+          </a:fontRef>
+        </p:style>
+      </p:cxnSp>
+      <p:cxnSp>
+        <p:nvCxnSpPr>
+          <p:cNvPr id="20" name="Conector reto 19">
+            <a:extLst>
+              <a:ext uri="{FF2B5EF4-FFF2-40B4-BE49-F238E27FC236}">
+                <a16:creationId xmlns:a16="http://schemas.microsoft.com/office/drawing/2014/main" id="{D4258351-664D-9C03-7932-5599A4E6307C}"/>
+              </a:ext>
+            </a:extLst>
+          </p:cNvPr>
+          <p:cNvCxnSpPr/>
+          <p:nvPr/>
+        </p:nvCxnSpPr>
+        <p:spPr>
+          <a:xfrm>
+            <a:off x="4482332" y="1485900"/>
+            <a:ext cx="0" cy="3886200"/>
+          </a:xfrm>
+          <a:prstGeom prst="line">
+            <a:avLst/>
+          </a:prstGeom>
+          <a:ln>
+            <a:solidFill>
+              <a:srgbClr val="FF0000"/>
+            </a:solidFill>
+          </a:ln>
+        </p:spPr>
+        <p:style>
+          <a:lnRef idx="1">
+            <a:schemeClr val="accent1"/>
+          </a:lnRef>
+          <a:fillRef idx="0">
+            <a:schemeClr val="accent1"/>
+          </a:fillRef>
+          <a:effectRef idx="0">
+            <a:schemeClr val="accent1"/>
+          </a:effectRef>
+          <a:fontRef idx="minor">
+            <a:schemeClr val="tx1"/>
+          </a:fontRef>
+        </p:style>
+      </p:cxnSp>
+      <p:cxnSp>
+        <p:nvCxnSpPr>
+          <p:cNvPr id="21" name="Conector reto 20">
+            <a:extLst>
+              <a:ext uri="{FF2B5EF4-FFF2-40B4-BE49-F238E27FC236}">
+                <a16:creationId xmlns:a16="http://schemas.microsoft.com/office/drawing/2014/main" id="{3BC9F6E9-2114-D03E-8911-28D7F397EF36}"/>
+              </a:ext>
+            </a:extLst>
+          </p:cNvPr>
+          <p:cNvCxnSpPr/>
+          <p:nvPr/>
+        </p:nvCxnSpPr>
+        <p:spPr>
+          <a:xfrm>
+            <a:off x="5682482" y="1568450"/>
+            <a:ext cx="0" cy="3886200"/>
+          </a:xfrm>
+          <a:prstGeom prst="line">
+            <a:avLst/>
+          </a:prstGeom>
+          <a:ln>
+            <a:solidFill>
+              <a:srgbClr val="FF0000"/>
+            </a:solidFill>
+          </a:ln>
+        </p:spPr>
+        <p:style>
+          <a:lnRef idx="1">
+            <a:schemeClr val="accent1"/>
+          </a:lnRef>
+          <a:fillRef idx="0">
+            <a:schemeClr val="accent1"/>
+          </a:fillRef>
+          <a:effectRef idx="0">
+            <a:schemeClr val="accent1"/>
+          </a:effectRef>
+          <a:fontRef idx="minor">
+            <a:schemeClr val="tx1"/>
+          </a:fontRef>
+        </p:style>
+      </p:cxnSp>
+      <p:cxnSp>
+        <p:nvCxnSpPr>
+          <p:cNvPr id="22" name="Conector reto 21">
+            <a:extLst>
+              <a:ext uri="{FF2B5EF4-FFF2-40B4-BE49-F238E27FC236}">
+                <a16:creationId xmlns:a16="http://schemas.microsoft.com/office/drawing/2014/main" id="{DD7B0B1C-4832-7020-C6CE-D927AB5DF95E}"/>
+              </a:ext>
+            </a:extLst>
+          </p:cNvPr>
+          <p:cNvCxnSpPr/>
+          <p:nvPr/>
+        </p:nvCxnSpPr>
+        <p:spPr>
+          <a:xfrm>
+            <a:off x="4779331" y="1867059"/>
+            <a:ext cx="0" cy="3886200"/>
+          </a:xfrm>
+          <a:prstGeom prst="line">
+            <a:avLst/>
+          </a:prstGeom>
+        </p:spPr>
+        <p:style>
+          <a:lnRef idx="1">
+            <a:schemeClr val="accent1"/>
+          </a:lnRef>
+          <a:fillRef idx="0">
+            <a:schemeClr val="accent1"/>
+          </a:fillRef>
+          <a:effectRef idx="0">
+            <a:schemeClr val="accent1"/>
+          </a:effectRef>
+          <a:fontRef idx="minor">
+            <a:schemeClr val="tx1"/>
+          </a:fontRef>
+        </p:style>
+      </p:cxnSp>
+      <p:cxnSp>
+        <p:nvCxnSpPr>
+          <p:cNvPr id="23" name="Conector reto 22">
+            <a:extLst>
+              <a:ext uri="{FF2B5EF4-FFF2-40B4-BE49-F238E27FC236}">
+                <a16:creationId xmlns:a16="http://schemas.microsoft.com/office/drawing/2014/main" id="{B66B06A6-BCA8-25F8-B4E0-5424D8A446E0}"/>
+              </a:ext>
+            </a:extLst>
+          </p:cNvPr>
+          <p:cNvCxnSpPr/>
+          <p:nvPr/>
+        </p:nvCxnSpPr>
+        <p:spPr>
+          <a:xfrm>
+            <a:off x="6190482" y="1612900"/>
+            <a:ext cx="0" cy="3886200"/>
+          </a:xfrm>
+          <a:prstGeom prst="line">
+            <a:avLst/>
+          </a:prstGeom>
+          <a:ln>
+            <a:solidFill>
+              <a:srgbClr val="FF0000"/>
+            </a:solidFill>
+          </a:ln>
+        </p:spPr>
+        <p:style>
+          <a:lnRef idx="1">
+            <a:schemeClr val="accent1"/>
+          </a:lnRef>
+          <a:fillRef idx="0">
+            <a:schemeClr val="accent1"/>
+          </a:fillRef>
+          <a:effectRef idx="0">
+            <a:schemeClr val="accent1"/>
+          </a:effectRef>
+          <a:fontRef idx="minor">
+            <a:schemeClr val="tx1"/>
+          </a:fontRef>
+        </p:style>
+      </p:cxnSp>
+      <p:cxnSp>
+        <p:nvCxnSpPr>
+          <p:cNvPr id="24" name="Conector reto 23">
+            <a:extLst>
+              <a:ext uri="{FF2B5EF4-FFF2-40B4-BE49-F238E27FC236}">
+                <a16:creationId xmlns:a16="http://schemas.microsoft.com/office/drawing/2014/main" id="{3B59DC5C-07C0-B9E4-0930-95AC7D7D89B6}"/>
+              </a:ext>
+            </a:extLst>
+          </p:cNvPr>
+          <p:cNvCxnSpPr/>
+          <p:nvPr/>
+        </p:nvCxnSpPr>
+        <p:spPr>
+          <a:xfrm>
+            <a:off x="6455096" y="2051209"/>
+            <a:ext cx="0" cy="3886200"/>
           </a:xfrm>
           <a:prstGeom prst="line">
             <a:avLst/>

</xml_diff>